<commit_message>
App will now be presented before conclusion
</commit_message>
<xml_diff>
--- a/PowerPoint/R_Project_Presentation.pptx
+++ b/PowerPoint/R_Project_Presentation.pptx
@@ -13,16 +13,16 @@
     <p:sldId id="263" r:id="rId4"/>
     <p:sldId id="275" r:id="rId5"/>
     <p:sldId id="264" r:id="rId6"/>
-    <p:sldId id="261" r:id="rId7"/>
-    <p:sldId id="277" r:id="rId8"/>
-    <p:sldId id="270" r:id="rId9"/>
-    <p:sldId id="300" r:id="rId10"/>
-    <p:sldId id="301" r:id="rId11"/>
-    <p:sldId id="262" r:id="rId12"/>
-    <p:sldId id="302" r:id="rId13"/>
-    <p:sldId id="303" r:id="rId14"/>
-    <p:sldId id="304" r:id="rId15"/>
-    <p:sldId id="305" r:id="rId16"/>
+    <p:sldId id="277" r:id="rId7"/>
+    <p:sldId id="270" r:id="rId8"/>
+    <p:sldId id="300" r:id="rId9"/>
+    <p:sldId id="301" r:id="rId10"/>
+    <p:sldId id="262" r:id="rId11"/>
+    <p:sldId id="302" r:id="rId12"/>
+    <p:sldId id="303" r:id="rId13"/>
+    <p:sldId id="304" r:id="rId14"/>
+    <p:sldId id="305" r:id="rId15"/>
+    <p:sldId id="261" r:id="rId16"/>
     <p:sldId id="258" r:id="rId17"/>
     <p:sldId id="266" r:id="rId18"/>
   </p:sldIdLst>
@@ -842,83 +842,6 @@
 </file>
 
 <file path=ppt/notesSlides/notesSlide10.xml><?xml version="1.0" encoding="utf-8"?>
-<p:notes xmlns:a="http://schemas.openxmlformats.org/drawingml/2006/main" xmlns:r="http://schemas.openxmlformats.org/officeDocument/2006/relationships" xmlns:p="http://schemas.openxmlformats.org/presentationml/2006/main">
-  <p:cSld>
-    <p:spTree>
-      <p:nvGrpSpPr>
-        <p:cNvPr id="1" name=""/>
-        <p:cNvGrpSpPr/>
-        <p:nvPr/>
-      </p:nvGrpSpPr>
-      <p:grpSpPr>
-        <a:xfrm>
-          <a:off x="0" y="0"/>
-          <a:ext cx="0" cy="0"/>
-          <a:chOff x="0" y="0"/>
-          <a:chExt cx="0" cy="0"/>
-        </a:xfrm>
-      </p:grpSpPr>
-      <p:sp>
-        <p:nvSpPr>
-          <p:cNvPr id="2" name="Slide Image Placeholder 1"/>
-          <p:cNvSpPr>
-            <a:spLocks noGrp="1" noRot="1" noChangeAspect="1"/>
-          </p:cNvSpPr>
-          <p:nvPr>
-            <p:ph type="sldImg"/>
-          </p:nvPr>
-        </p:nvSpPr>
-        <p:spPr>
-          <a:xfrm>
-            <a:off x="381000" y="685800"/>
-            <a:ext cx="6096000" cy="3429000"/>
-          </a:xfrm>
-        </p:spPr>
-      </p:sp>
-      <p:sp>
-        <p:nvSpPr>
-          <p:cNvPr id="3" name="Notes Placeholder 2"/>
-          <p:cNvSpPr>
-            <a:spLocks noGrp="1"/>
-          </p:cNvSpPr>
-          <p:nvPr>
-            <p:ph type="body" idx="1"/>
-          </p:nvPr>
-        </p:nvSpPr>
-        <p:spPr/>
-        <p:txBody>
-          <a:bodyPr/>
-          <a:lstStyle/>
-          <a:p>
-            <a:pPr marL="158750" indent="0">
-              <a:buNone/>
-            </a:pPr>
-            <a:r>
-              <a:rPr lang="en-US" dirty="0" smtClean="0"/>
-              <a:t>Anti-pluralism</a:t>
-            </a:r>
-            <a:r>
-              <a:rPr lang="en-US" baseline="0" dirty="0" smtClean="0"/>
-              <a:t> is when the political parties lack a commitment to democratic norms, usually involving demonizing political opponents, favoring the will of the majority over the minority, and even accepting violence as a necessary method of action. Anti-pluralism is shown in populist parties, and the impact of populism’s effect against democracy is amplified when anti-pluralism is used. Although populism by itself was statistically significant, the strength of the relationships were weak. When anti-pluralism was also used, the strength of the relationships were much more impactful, and the variance was much higher. In fact, both when in government and when in opposition, an anti-pluralist, populist party still maintained a strong negative impact on democracy.</a:t>
-            </a:r>
-            <a:endParaRPr lang="en-US" dirty="0"/>
-          </a:p>
-        </p:txBody>
-      </p:sp>
-    </p:spTree>
-    <p:extLst>
-      <p:ext uri="{BB962C8B-B14F-4D97-AF65-F5344CB8AC3E}">
-        <p14:creationId xmlns:p14="http://schemas.microsoft.com/office/powerpoint/2010/main" val="776842907"/>
-      </p:ext>
-    </p:extLst>
-  </p:cSld>
-  <p:clrMapOvr>
-    <a:masterClrMapping/>
-  </p:clrMapOvr>
-</p:notes>
-</file>
-
-<file path=ppt/notesSlides/notesSlide11.xml><?xml version="1.0" encoding="utf-8"?>
 <p:notes xmlns:a="http://schemas.openxmlformats.org/drawingml/2006/main" xmlns:r="http://schemas.openxmlformats.org/officeDocument/2006/relationships" xmlns:p="http://schemas.openxmlformats.org/presentationml/2006/main" showMasterSp="0" showMasterPhAnim="0">
   <p:cSld>
     <p:spTree>
@@ -1030,6 +953,78 @@
 </p:notes>
 </file>
 
+<file path=ppt/notesSlides/notesSlide11.xml><?xml version="1.0" encoding="utf-8"?>
+<p:notes xmlns:a="http://schemas.openxmlformats.org/drawingml/2006/main" xmlns:r="http://schemas.openxmlformats.org/officeDocument/2006/relationships" xmlns:p="http://schemas.openxmlformats.org/presentationml/2006/main">
+  <p:cSld>
+    <p:spTree>
+      <p:nvGrpSpPr>
+        <p:cNvPr id="1" name=""/>
+        <p:cNvGrpSpPr/>
+        <p:nvPr/>
+      </p:nvGrpSpPr>
+      <p:grpSpPr>
+        <a:xfrm>
+          <a:off x="0" y="0"/>
+          <a:ext cx="0" cy="0"/>
+          <a:chOff x="0" y="0"/>
+          <a:chExt cx="0" cy="0"/>
+        </a:xfrm>
+      </p:grpSpPr>
+      <p:sp>
+        <p:nvSpPr>
+          <p:cNvPr id="2" name="Slide Image Placeholder 1"/>
+          <p:cNvSpPr>
+            <a:spLocks noGrp="1" noRot="1" noChangeAspect="1"/>
+          </p:cNvSpPr>
+          <p:nvPr>
+            <p:ph type="sldImg"/>
+          </p:nvPr>
+        </p:nvSpPr>
+        <p:spPr/>
+      </p:sp>
+      <p:sp>
+        <p:nvSpPr>
+          <p:cNvPr id="3" name="Notes Placeholder 2"/>
+          <p:cNvSpPr>
+            <a:spLocks noGrp="1"/>
+          </p:cNvSpPr>
+          <p:nvPr>
+            <p:ph type="body" idx="1"/>
+          </p:nvPr>
+        </p:nvSpPr>
+        <p:spPr/>
+        <p:txBody>
+          <a:bodyPr/>
+          <a:lstStyle/>
+          <a:p>
+            <a:pPr marL="158750" indent="0">
+              <a:buNone/>
+            </a:pPr>
+            <a:r>
+              <a:rPr lang="en-US" dirty="0" smtClean="0"/>
+              <a:t>Political</a:t>
+            </a:r>
+            <a:r>
+              <a:rPr lang="en-US" baseline="0" dirty="0" smtClean="0"/>
+              <a:t> polarization is unique in that it has been increasing since the 2000s, so much so that it is increasing regardless of the decrease occasionally in anti-pluralism. Also, unlike anti-pluralism, it is on a clear rise across the world.</a:t>
+            </a:r>
+            <a:endParaRPr lang="en-US" dirty="0"/>
+          </a:p>
+        </p:txBody>
+      </p:sp>
+    </p:spTree>
+    <p:extLst>
+      <p:ext uri="{BB962C8B-B14F-4D97-AF65-F5344CB8AC3E}">
+        <p14:creationId xmlns:p14="http://schemas.microsoft.com/office/powerpoint/2010/main" val="1614992535"/>
+      </p:ext>
+    </p:extLst>
+  </p:cSld>
+  <p:clrMapOvr>
+    <a:masterClrMapping/>
+  </p:clrMapOvr>
+</p:notes>
+</file>
+
 <file path=ppt/notesSlides/notesSlide12.xml><?xml version="1.0" encoding="utf-8"?>
 <p:notes xmlns:a="http://schemas.openxmlformats.org/drawingml/2006/main" xmlns:r="http://schemas.openxmlformats.org/officeDocument/2006/relationships" xmlns:p="http://schemas.openxmlformats.org/presentationml/2006/main">
   <p:cSld>
@@ -1079,11 +1074,11 @@
             </a:pPr>
             <a:r>
               <a:rPr lang="en-US" dirty="0" smtClean="0"/>
-              <a:t>Political</a:t>
+              <a:t>Unlike anti-pluralism</a:t>
             </a:r>
             <a:r>
               <a:rPr lang="en-US" baseline="0" dirty="0" smtClean="0"/>
-              <a:t> polarization is unique in that it has been increasing since the 2000s, so much so that it is increasing regardless of the decrease occasionally in anti-pluralism. Also, unlike anti-pluralism, it is on a clear rise across the world.</a:t>
+              <a:t> and populism, polarization was statistically significant in all regions of the world. However, it should be noted that its “strength”, along with its variance, was only high in regions that actually had a high amount of electoral democracies. This means that polarization seems to require the ability to be politically expressive, along with having political variation, in order to have an impact. In fact, the Middle Eastern regions, which still have monarchies, even had a very slight increasing trend, although next to no variance.</a:t>
             </a:r>
             <a:endParaRPr lang="en-US" dirty="0"/>
           </a:p>
@@ -1092,7 +1087,7 @@
     </p:spTree>
     <p:extLst>
       <p:ext uri="{BB962C8B-B14F-4D97-AF65-F5344CB8AC3E}">
-        <p14:creationId xmlns:p14="http://schemas.microsoft.com/office/powerpoint/2010/main" val="1614992535"/>
+        <p14:creationId xmlns:p14="http://schemas.microsoft.com/office/powerpoint/2010/main" val="368090723"/>
       </p:ext>
     </p:extLst>
   </p:cSld>
@@ -1151,11 +1146,19 @@
             </a:pPr>
             <a:r>
               <a:rPr lang="en-US" dirty="0" smtClean="0"/>
-              <a:t>Unlike anti-pluralism</a:t>
+              <a:t>Wealth</a:t>
             </a:r>
             <a:r>
               <a:rPr lang="en-US" baseline="0" dirty="0" smtClean="0"/>
-              <a:t> and populism, polarization was statistically significant in all regions of the world. However, it should be noted that its “strength”, along with its variance, was only high in regions that actually had a high amount of electoral democracies. This means that polarization seems to require the ability to be politically expressive, along with having political variation, in order to have an impact. In fact, the Middle Eastern regions, which still have monarchies, even had a very slight increasing trend, although next to no variance.</a:t>
+              <a:t> inequality is used as a background factor in the V-Dem codebook, but is still blamed as one of the most significant factors in causing democratic backsliding. It was removed as a factor in the most recent codebook, therefore the data had to be taken from somewhere else and the trends are mixed. Most countries have a stable Gini </a:t>
+            </a:r>
+            <a:r>
+              <a:rPr lang="en-US" baseline="0" dirty="0" err="1" smtClean="0"/>
+              <a:t>coef</a:t>
+            </a:r>
+            <a:r>
+              <a:rPr lang="en-US" baseline="0" dirty="0" smtClean="0"/>
+              <a:t>., so it can’t be compared against the democracy index. However, when it doesn’t like with Colombia, they do reflect off each other. </a:t>
             </a:r>
             <a:endParaRPr lang="en-US" dirty="0"/>
           </a:p>
@@ -1164,7 +1167,7 @@
     </p:spTree>
     <p:extLst>
       <p:ext uri="{BB962C8B-B14F-4D97-AF65-F5344CB8AC3E}">
-        <p14:creationId xmlns:p14="http://schemas.microsoft.com/office/powerpoint/2010/main" val="368090723"/>
+        <p14:creationId xmlns:p14="http://schemas.microsoft.com/office/powerpoint/2010/main" val="2693987042"/>
       </p:ext>
     </p:extLst>
   </p:cSld>
@@ -1223,86 +1226,6 @@
             </a:pPr>
             <a:r>
               <a:rPr lang="en-US" dirty="0" smtClean="0"/>
-              <a:t>Wealth</a:t>
-            </a:r>
-            <a:r>
-              <a:rPr lang="en-US" baseline="0" dirty="0" smtClean="0"/>
-              <a:t> inequality is used as a background factor in the V-Dem codebook, but is still blamed as one of the most significant factors in causing democratic backsliding. It was removed as a factor in the most recent codebook, therefore the data had to be taken from somewhere else and the trends are mixed. Most countries have a stable Gini </a:t>
-            </a:r>
-            <a:r>
-              <a:rPr lang="en-US" baseline="0" dirty="0" err="1" smtClean="0"/>
-              <a:t>coef</a:t>
-            </a:r>
-            <a:r>
-              <a:rPr lang="en-US" baseline="0" dirty="0" smtClean="0"/>
-              <a:t>., so it can’t be compared against the democracy index. However, when it doesn’t like with Colombia, they do reflect off each other. </a:t>
-            </a:r>
-            <a:endParaRPr lang="en-US" dirty="0"/>
-          </a:p>
-        </p:txBody>
-      </p:sp>
-    </p:spTree>
-    <p:extLst>
-      <p:ext uri="{BB962C8B-B14F-4D97-AF65-F5344CB8AC3E}">
-        <p14:creationId xmlns:p14="http://schemas.microsoft.com/office/powerpoint/2010/main" val="2693987042"/>
-      </p:ext>
-    </p:extLst>
-  </p:cSld>
-  <p:clrMapOvr>
-    <a:masterClrMapping/>
-  </p:clrMapOvr>
-</p:notes>
-</file>
-
-<file path=ppt/notesSlides/notesSlide15.xml><?xml version="1.0" encoding="utf-8"?>
-<p:notes xmlns:a="http://schemas.openxmlformats.org/drawingml/2006/main" xmlns:r="http://schemas.openxmlformats.org/officeDocument/2006/relationships" xmlns:p="http://schemas.openxmlformats.org/presentationml/2006/main">
-  <p:cSld>
-    <p:spTree>
-      <p:nvGrpSpPr>
-        <p:cNvPr id="1" name=""/>
-        <p:cNvGrpSpPr/>
-        <p:nvPr/>
-      </p:nvGrpSpPr>
-      <p:grpSpPr>
-        <a:xfrm>
-          <a:off x="0" y="0"/>
-          <a:ext cx="0" cy="0"/>
-          <a:chOff x="0" y="0"/>
-          <a:chExt cx="0" cy="0"/>
-        </a:xfrm>
-      </p:grpSpPr>
-      <p:sp>
-        <p:nvSpPr>
-          <p:cNvPr id="2" name="Slide Image Placeholder 1"/>
-          <p:cNvSpPr>
-            <a:spLocks noGrp="1" noRot="1" noChangeAspect="1"/>
-          </p:cNvSpPr>
-          <p:nvPr>
-            <p:ph type="sldImg"/>
-          </p:nvPr>
-        </p:nvSpPr>
-        <p:spPr/>
-      </p:sp>
-      <p:sp>
-        <p:nvSpPr>
-          <p:cNvPr id="3" name="Notes Placeholder 2"/>
-          <p:cNvSpPr>
-            <a:spLocks noGrp="1"/>
-          </p:cNvSpPr>
-          <p:nvPr>
-            <p:ph type="body" idx="1"/>
-          </p:nvPr>
-        </p:nvSpPr>
-        <p:spPr/>
-        <p:txBody>
-          <a:bodyPr/>
-          <a:lstStyle/>
-          <a:p>
-            <a:pPr marL="158750" indent="0">
-              <a:buNone/>
-            </a:pPr>
-            <a:r>
-              <a:rPr lang="en-US" dirty="0" smtClean="0"/>
               <a:t>Even still, this factor was the weakest of all</a:t>
             </a:r>
             <a:r>
@@ -1319,6 +1242,118 @@
         <p14:creationId xmlns:p14="http://schemas.microsoft.com/office/powerpoint/2010/main" val="207247487"/>
       </p:ext>
     </p:extLst>
+  </p:cSld>
+  <p:clrMapOvr>
+    <a:masterClrMapping/>
+  </p:clrMapOvr>
+</p:notes>
+</file>
+
+<file path=ppt/notesSlides/notesSlide15.xml><?xml version="1.0" encoding="utf-8"?>
+<p:notes xmlns:a="http://schemas.openxmlformats.org/drawingml/2006/main" xmlns:r="http://schemas.openxmlformats.org/officeDocument/2006/relationships" xmlns:p="http://schemas.openxmlformats.org/presentationml/2006/main" showMasterSp="0" showMasterPhAnim="0">
+  <p:cSld>
+    <p:spTree>
+      <p:nvGrpSpPr>
+        <p:cNvPr id="1" name="Shape 407"/>
+        <p:cNvGrpSpPr/>
+        <p:nvPr/>
+      </p:nvGrpSpPr>
+      <p:grpSpPr>
+        <a:xfrm>
+          <a:off x="0" y="0"/>
+          <a:ext cx="0" cy="0"/>
+          <a:chOff x="0" y="0"/>
+          <a:chExt cx="0" cy="0"/>
+        </a:xfrm>
+      </p:grpSpPr>
+      <p:sp>
+        <p:nvSpPr>
+          <p:cNvPr id="408" name="Google Shape;408;g254064a4421_0_96:notes"/>
+          <p:cNvSpPr>
+            <a:spLocks noGrp="1" noRot="1" noChangeAspect="1"/>
+          </p:cNvSpPr>
+          <p:nvPr>
+            <p:ph type="sldImg" idx="2"/>
+          </p:nvPr>
+        </p:nvSpPr>
+        <p:spPr>
+          <a:xfrm>
+            <a:off x="381000" y="685800"/>
+            <a:ext cx="6096000" cy="3429000"/>
+          </a:xfrm>
+          <a:custGeom>
+            <a:avLst/>
+            <a:gdLst/>
+            <a:ahLst/>
+            <a:cxnLst/>
+            <a:rect l="l" t="t" r="r" b="b"/>
+            <a:pathLst>
+              <a:path w="120000" h="120000" extrusionOk="0">
+                <a:moveTo>
+                  <a:pt x="0" y="0"/>
+                </a:moveTo>
+                <a:lnTo>
+                  <a:pt x="120000" y="0"/>
+                </a:lnTo>
+                <a:lnTo>
+                  <a:pt x="120000" y="120000"/>
+                </a:lnTo>
+                <a:lnTo>
+                  <a:pt x="0" y="120000"/>
+                </a:lnTo>
+                <a:close/>
+              </a:path>
+            </a:pathLst>
+          </a:custGeom>
+        </p:spPr>
+      </p:sp>
+      <p:sp>
+        <p:nvSpPr>
+          <p:cNvPr id="409" name="Google Shape;409;g254064a4421_0_96:notes"/>
+          <p:cNvSpPr txBox="1">
+            <a:spLocks noGrp="1"/>
+          </p:cNvSpPr>
+          <p:nvPr>
+            <p:ph type="body" idx="1"/>
+          </p:nvPr>
+        </p:nvSpPr>
+        <p:spPr>
+          <a:xfrm>
+            <a:off x="685800" y="4343400"/>
+            <a:ext cx="5486400" cy="4114800"/>
+          </a:xfrm>
+          <a:prstGeom prst="rect">
+            <a:avLst/>
+          </a:prstGeom>
+        </p:spPr>
+        <p:txBody>
+          <a:bodyPr spcFirstLastPara="1" wrap="square" lIns="91425" tIns="91425" rIns="91425" bIns="91425" anchor="t" anchorCtr="0">
+            <a:noAutofit/>
+          </a:bodyPr>
+          <a:lstStyle/>
+          <a:p>
+            <a:pPr marL="0" lvl="0" indent="0" algn="l" rtl="0">
+              <a:spcBef>
+                <a:spcPts val="0"/>
+              </a:spcBef>
+              <a:spcAft>
+                <a:spcPts val="0"/>
+              </a:spcAft>
+              <a:buNone/>
+            </a:pPr>
+            <a:r>
+              <a:rPr lang="en-US" dirty="0" smtClean="0"/>
+              <a:t>To put these measurements into</a:t>
+            </a:r>
+            <a:r>
+              <a:rPr lang="en-US" baseline="0" dirty="0" smtClean="0"/>
+              <a:t> perspective, an R-Shiny app was creating, which was the point of the project. It is a combination of technically four datasets, one of which was created by hand, with the goal of matching the results of the V-Dem Project and creating an interactive and reactive app. </a:t>
+            </a:r>
+            <a:endParaRPr dirty="0"/>
+          </a:p>
+        </p:txBody>
+      </p:sp>
+    </p:spTree>
   </p:cSld>
   <p:clrMapOvr>
     <a:masterClrMapping/>
@@ -2070,118 +2105,6 @@
   <p:cSld>
     <p:spTree>
       <p:nvGrpSpPr>
-        <p:cNvPr id="1" name="Shape 407"/>
-        <p:cNvGrpSpPr/>
-        <p:nvPr/>
-      </p:nvGrpSpPr>
-      <p:grpSpPr>
-        <a:xfrm>
-          <a:off x="0" y="0"/>
-          <a:ext cx="0" cy="0"/>
-          <a:chOff x="0" y="0"/>
-          <a:chExt cx="0" cy="0"/>
-        </a:xfrm>
-      </p:grpSpPr>
-      <p:sp>
-        <p:nvSpPr>
-          <p:cNvPr id="408" name="Google Shape;408;g254064a4421_0_96:notes"/>
-          <p:cNvSpPr>
-            <a:spLocks noGrp="1" noRot="1" noChangeAspect="1"/>
-          </p:cNvSpPr>
-          <p:nvPr>
-            <p:ph type="sldImg" idx="2"/>
-          </p:nvPr>
-        </p:nvSpPr>
-        <p:spPr>
-          <a:xfrm>
-            <a:off x="381000" y="685800"/>
-            <a:ext cx="6096000" cy="3429000"/>
-          </a:xfrm>
-          <a:custGeom>
-            <a:avLst/>
-            <a:gdLst/>
-            <a:ahLst/>
-            <a:cxnLst/>
-            <a:rect l="l" t="t" r="r" b="b"/>
-            <a:pathLst>
-              <a:path w="120000" h="120000" extrusionOk="0">
-                <a:moveTo>
-                  <a:pt x="0" y="0"/>
-                </a:moveTo>
-                <a:lnTo>
-                  <a:pt x="120000" y="0"/>
-                </a:lnTo>
-                <a:lnTo>
-                  <a:pt x="120000" y="120000"/>
-                </a:lnTo>
-                <a:lnTo>
-                  <a:pt x="0" y="120000"/>
-                </a:lnTo>
-                <a:close/>
-              </a:path>
-            </a:pathLst>
-          </a:custGeom>
-        </p:spPr>
-      </p:sp>
-      <p:sp>
-        <p:nvSpPr>
-          <p:cNvPr id="409" name="Google Shape;409;g254064a4421_0_96:notes"/>
-          <p:cNvSpPr txBox="1">
-            <a:spLocks noGrp="1"/>
-          </p:cNvSpPr>
-          <p:nvPr>
-            <p:ph type="body" idx="1"/>
-          </p:nvPr>
-        </p:nvSpPr>
-        <p:spPr>
-          <a:xfrm>
-            <a:off x="685800" y="4343400"/>
-            <a:ext cx="5486400" cy="4114800"/>
-          </a:xfrm>
-          <a:prstGeom prst="rect">
-            <a:avLst/>
-          </a:prstGeom>
-        </p:spPr>
-        <p:txBody>
-          <a:bodyPr spcFirstLastPara="1" wrap="square" lIns="91425" tIns="91425" rIns="91425" bIns="91425" anchor="t" anchorCtr="0">
-            <a:noAutofit/>
-          </a:bodyPr>
-          <a:lstStyle/>
-          <a:p>
-            <a:pPr marL="0" lvl="0" indent="0" algn="l" rtl="0">
-              <a:spcBef>
-                <a:spcPts val="0"/>
-              </a:spcBef>
-              <a:spcAft>
-                <a:spcPts val="0"/>
-              </a:spcAft>
-              <a:buNone/>
-            </a:pPr>
-            <a:r>
-              <a:rPr lang="en-US" dirty="0" smtClean="0"/>
-              <a:t>To put these measurements into</a:t>
-            </a:r>
-            <a:r>
-              <a:rPr lang="en-US" baseline="0" dirty="0" smtClean="0"/>
-              <a:t> perspective, an R-Shiny app was creating, which was the point of the project. It is a combination of technically four datasets, one of which was created by hand, with the goal of matching the results of the V-Dem Project and creating an interactive and reactive app. </a:t>
-            </a:r>
-            <a:endParaRPr dirty="0"/>
-          </a:p>
-        </p:txBody>
-      </p:sp>
-    </p:spTree>
-  </p:cSld>
-  <p:clrMapOvr>
-    <a:masterClrMapping/>
-  </p:clrMapOvr>
-</p:notes>
-</file>
-
-<file path=ppt/notesSlides/notesSlide7.xml><?xml version="1.0" encoding="utf-8"?>
-<p:notes xmlns:a="http://schemas.openxmlformats.org/drawingml/2006/main" xmlns:r="http://schemas.openxmlformats.org/officeDocument/2006/relationships" xmlns:p="http://schemas.openxmlformats.org/presentationml/2006/main" showMasterSp="0" showMasterPhAnim="0">
-  <p:cSld>
-    <p:spTree>
-      <p:nvGrpSpPr>
         <p:cNvPr id="1" name="Shape 718"/>
         <p:cNvGrpSpPr/>
         <p:nvPr/>
@@ -2305,7 +2228,7 @@
 </p:notes>
 </file>
 
-<file path=ppt/notesSlides/notesSlide8.xml><?xml version="1.0" encoding="utf-8"?>
+<file path=ppt/notesSlides/notesSlide7.xml><?xml version="1.0" encoding="utf-8"?>
 <p:notes xmlns:a="http://schemas.openxmlformats.org/drawingml/2006/main" xmlns:r="http://schemas.openxmlformats.org/officeDocument/2006/relationships" xmlns:p="http://schemas.openxmlformats.org/presentationml/2006/main" showMasterSp="0" showMasterPhAnim="0">
   <p:cSld>
     <p:spTree>
@@ -2433,7 +2356,7 @@
 </p:notes>
 </file>
 
-<file path=ppt/notesSlides/notesSlide9.xml><?xml version="1.0" encoding="utf-8"?>
+<file path=ppt/notesSlides/notesSlide8.xml><?xml version="1.0" encoding="utf-8"?>
 <p:notes xmlns:a="http://schemas.openxmlformats.org/drawingml/2006/main" xmlns:r="http://schemas.openxmlformats.org/officeDocument/2006/relationships" xmlns:p="http://schemas.openxmlformats.org/presentationml/2006/main">
   <p:cSld>
     <p:spTree>
@@ -2496,6 +2419,83 @@
     <p:extLst>
       <p:ext uri="{BB962C8B-B14F-4D97-AF65-F5344CB8AC3E}">
         <p14:creationId xmlns:p14="http://schemas.microsoft.com/office/powerpoint/2010/main" val="988786607"/>
+      </p:ext>
+    </p:extLst>
+  </p:cSld>
+  <p:clrMapOvr>
+    <a:masterClrMapping/>
+  </p:clrMapOvr>
+</p:notes>
+</file>
+
+<file path=ppt/notesSlides/notesSlide9.xml><?xml version="1.0" encoding="utf-8"?>
+<p:notes xmlns:a="http://schemas.openxmlformats.org/drawingml/2006/main" xmlns:r="http://schemas.openxmlformats.org/officeDocument/2006/relationships" xmlns:p="http://schemas.openxmlformats.org/presentationml/2006/main">
+  <p:cSld>
+    <p:spTree>
+      <p:nvGrpSpPr>
+        <p:cNvPr id="1" name=""/>
+        <p:cNvGrpSpPr/>
+        <p:nvPr/>
+      </p:nvGrpSpPr>
+      <p:grpSpPr>
+        <a:xfrm>
+          <a:off x="0" y="0"/>
+          <a:ext cx="0" cy="0"/>
+          <a:chOff x="0" y="0"/>
+          <a:chExt cx="0" cy="0"/>
+        </a:xfrm>
+      </p:grpSpPr>
+      <p:sp>
+        <p:nvSpPr>
+          <p:cNvPr id="2" name="Slide Image Placeholder 1"/>
+          <p:cNvSpPr>
+            <a:spLocks noGrp="1" noRot="1" noChangeAspect="1"/>
+          </p:cNvSpPr>
+          <p:nvPr>
+            <p:ph type="sldImg"/>
+          </p:nvPr>
+        </p:nvSpPr>
+        <p:spPr>
+          <a:xfrm>
+            <a:off x="381000" y="685800"/>
+            <a:ext cx="6096000" cy="3429000"/>
+          </a:xfrm>
+        </p:spPr>
+      </p:sp>
+      <p:sp>
+        <p:nvSpPr>
+          <p:cNvPr id="3" name="Notes Placeholder 2"/>
+          <p:cNvSpPr>
+            <a:spLocks noGrp="1"/>
+          </p:cNvSpPr>
+          <p:nvPr>
+            <p:ph type="body" idx="1"/>
+          </p:nvPr>
+        </p:nvSpPr>
+        <p:spPr/>
+        <p:txBody>
+          <a:bodyPr/>
+          <a:lstStyle/>
+          <a:p>
+            <a:pPr marL="158750" indent="0">
+              <a:buNone/>
+            </a:pPr>
+            <a:r>
+              <a:rPr lang="en-US" dirty="0" smtClean="0"/>
+              <a:t>Anti-pluralism</a:t>
+            </a:r>
+            <a:r>
+              <a:rPr lang="en-US" baseline="0" dirty="0" smtClean="0"/>
+              <a:t> is when the political parties lack a commitment to democratic norms, usually involving demonizing political opponents, favoring the will of the majority over the minority, and even accepting violence as a necessary method of action. Anti-pluralism is shown in populist parties, and the impact of populism’s effect against democracy is amplified when anti-pluralism is used. Although populism by itself was statistically significant, the strength of the relationships were weak. When anti-pluralism was also used, the strength of the relationships were much more impactful, and the variance was much higher. In fact, both when in government and when in opposition, an anti-pluralist, populist party still maintained a strong negative impact on democracy.</a:t>
+            </a:r>
+            <a:endParaRPr lang="en-US" dirty="0"/>
+          </a:p>
+        </p:txBody>
+      </p:sp>
+    </p:spTree>
+    <p:extLst>
+      <p:ext uri="{BB962C8B-B14F-4D97-AF65-F5344CB8AC3E}">
+        <p14:creationId xmlns:p14="http://schemas.microsoft.com/office/powerpoint/2010/main" val="776842907"/>
       </p:ext>
     </p:extLst>
   </p:cSld>
@@ -17692,257 +17692,6 @@
   <p:cSld>
     <p:spTree>
       <p:nvGrpSpPr>
-        <p:cNvPr id="1" name=""/>
-        <p:cNvGrpSpPr/>
-        <p:nvPr/>
-      </p:nvGrpSpPr>
-      <p:grpSpPr>
-        <a:xfrm>
-          <a:off x="0" y="0"/>
-          <a:ext cx="0" cy="0"/>
-          <a:chOff x="0" y="0"/>
-          <a:chExt cx="0" cy="0"/>
-        </a:xfrm>
-      </p:grpSpPr>
-      <p:sp>
-        <p:nvSpPr>
-          <p:cNvPr id="2" name="Title 1"/>
-          <p:cNvSpPr>
-            <a:spLocks noGrp="1"/>
-          </p:cNvSpPr>
-          <p:nvPr>
-            <p:ph type="title"/>
-          </p:nvPr>
-        </p:nvSpPr>
-        <p:spPr>
-          <a:xfrm>
-            <a:off x="163099" y="65884"/>
-            <a:ext cx="7717500" cy="577800"/>
-          </a:xfrm>
-        </p:spPr>
-        <p:txBody>
-          <a:bodyPr/>
-          <a:lstStyle/>
-          <a:p>
-            <a:r>
-              <a:rPr lang="en-US" dirty="0" smtClean="0"/>
-              <a:t>A New Order: The Populist Rhetoric</a:t>
-            </a:r>
-            <a:endParaRPr lang="en-US" dirty="0"/>
-          </a:p>
-        </p:txBody>
-      </p:sp>
-      <p:pic>
-        <p:nvPicPr>
-          <p:cNvPr id="5" name="Picture 4"/>
-          <p:cNvPicPr>
-            <a:picLocks noChangeAspect="1"/>
-          </p:cNvPicPr>
-          <p:nvPr/>
-        </p:nvPicPr>
-        <p:blipFill>
-          <a:blip r:embed="rId3">
-            <a:extLst>
-              <a:ext uri="{28A0092B-C50C-407E-A947-70E740481C1C}">
-                <a14:useLocalDpi xmlns:a14="http://schemas.microsoft.com/office/drawing/2010/main" val="0"/>
-              </a:ext>
-            </a:extLst>
-          </a:blip>
-          <a:stretch>
-            <a:fillRect/>
-          </a:stretch>
-        </p:blipFill>
-        <p:spPr>
-          <a:xfrm>
-            <a:off x="4674761" y="1620644"/>
-            <a:ext cx="3904477" cy="3196954"/>
-          </a:xfrm>
-          <a:prstGeom prst="rect">
-            <a:avLst/>
-          </a:prstGeom>
-        </p:spPr>
-      </p:pic>
-      <p:pic>
-        <p:nvPicPr>
-          <p:cNvPr id="6" name="Picture 5"/>
-          <p:cNvPicPr>
-            <a:picLocks noChangeAspect="1"/>
-          </p:cNvPicPr>
-          <p:nvPr/>
-        </p:nvPicPr>
-        <p:blipFill>
-          <a:blip r:embed="rId4">
-            <a:extLst>
-              <a:ext uri="{28A0092B-C50C-407E-A947-70E740481C1C}">
-                <a14:useLocalDpi xmlns:a14="http://schemas.microsoft.com/office/drawing/2010/main" val="0"/>
-              </a:ext>
-            </a:extLst>
-          </a:blip>
-          <a:stretch>
-            <a:fillRect/>
-          </a:stretch>
-        </p:blipFill>
-        <p:spPr>
-          <a:xfrm>
-            <a:off x="378689" y="1620644"/>
-            <a:ext cx="3885987" cy="3181815"/>
-          </a:xfrm>
-          <a:prstGeom prst="rect">
-            <a:avLst/>
-          </a:prstGeom>
-        </p:spPr>
-      </p:pic>
-      <p:sp>
-        <p:nvSpPr>
-          <p:cNvPr id="7" name="Google Shape;706;p54"/>
-          <p:cNvSpPr txBox="1">
-            <a:spLocks noGrp="1"/>
-          </p:cNvSpPr>
-          <p:nvPr>
-            <p:ph type="subTitle" idx="1"/>
-          </p:nvPr>
-        </p:nvSpPr>
-        <p:spPr>
-          <a:xfrm>
-            <a:off x="163098" y="703157"/>
-            <a:ext cx="8416139" cy="917487"/>
-          </a:xfrm>
-          <a:prstGeom prst="rect">
-            <a:avLst/>
-          </a:prstGeom>
-        </p:spPr>
-        <p:txBody>
-          <a:bodyPr spcFirstLastPara="1" wrap="square" lIns="91425" tIns="91425" rIns="91425" bIns="91425" anchor="t" anchorCtr="0">
-            <a:noAutofit/>
-          </a:bodyPr>
-          <a:lstStyle/>
-          <a:p>
-            <a:pPr marL="285750" lvl="0" indent="-285750" algn="l">
-              <a:buFont typeface="Arial" panose="020B0604020202020204" pitchFamily="34" charset="0"/>
-              <a:buChar char="•"/>
-            </a:pPr>
-            <a:r>
-              <a:rPr lang="en-US" dirty="0" smtClean="0"/>
-              <a:t>Analysis shows that populism is a significant factor when it comes to the liberal democracy index, almost across the board. Both in and out of government, the results are statistically significant, when the Senior Partner having the strongest relationship. Only for populism’s “in government but not represented” is it not statistically significant, but that can easily be blamed on the lack of data.</a:t>
-            </a:r>
-            <a:endParaRPr dirty="0"/>
-          </a:p>
-        </p:txBody>
-      </p:sp>
-      <p:sp>
-        <p:nvSpPr>
-          <p:cNvPr id="9" name="Google Shape;706;p54"/>
-          <p:cNvSpPr txBox="1">
-            <a:spLocks noGrp="1"/>
-          </p:cNvSpPr>
-          <p:nvPr>
-            <p:ph type="subTitle" idx="1"/>
-          </p:nvPr>
-        </p:nvSpPr>
-        <p:spPr>
-          <a:xfrm>
-            <a:off x="5352585" y="4802459"/>
-            <a:ext cx="3442010" cy="341041"/>
-          </a:xfrm>
-          <a:prstGeom prst="rect">
-            <a:avLst/>
-          </a:prstGeom>
-        </p:spPr>
-        <p:txBody>
-          <a:bodyPr spcFirstLastPara="1" wrap="square" lIns="91425" tIns="91425" rIns="91425" bIns="91425" anchor="t" anchorCtr="0">
-            <a:noAutofit/>
-          </a:bodyPr>
-          <a:lstStyle/>
-          <a:p>
-            <a:pPr lvl="0" indent="0"/>
-            <a:r>
-              <a:rPr lang="en-US" dirty="0"/>
-              <a:t>In Opposition: </a:t>
-            </a:r>
-            <a:r>
-              <a:rPr lang="en-US" dirty="0" smtClean="0"/>
-              <a:t>T:-44.62, </a:t>
-            </a:r>
-            <a:r>
-              <a:rPr lang="en-US" dirty="0"/>
-              <a:t>&lt;</a:t>
-            </a:r>
-            <a:r>
-              <a:rPr lang="en-US" dirty="0" smtClean="0"/>
-              <a:t>2e-16***</a:t>
-            </a:r>
-            <a:endParaRPr dirty="0"/>
-          </a:p>
-        </p:txBody>
-      </p:sp>
-      <p:sp>
-        <p:nvSpPr>
-          <p:cNvPr id="10" name="Google Shape;706;p54"/>
-          <p:cNvSpPr txBox="1">
-            <a:spLocks noGrp="1"/>
-          </p:cNvSpPr>
-          <p:nvPr>
-            <p:ph type="subTitle" idx="1"/>
-          </p:nvPr>
-        </p:nvSpPr>
-        <p:spPr>
-          <a:xfrm>
-            <a:off x="378689" y="4817598"/>
-            <a:ext cx="3724960" cy="341041"/>
-          </a:xfrm>
-          <a:prstGeom prst="rect">
-            <a:avLst/>
-          </a:prstGeom>
-        </p:spPr>
-        <p:txBody>
-          <a:bodyPr spcFirstLastPara="1" wrap="square" lIns="91425" tIns="91425" rIns="91425" bIns="91425" anchor="t" anchorCtr="0">
-            <a:noAutofit/>
-          </a:bodyPr>
-          <a:lstStyle/>
-          <a:p>
-            <a:pPr lvl="0" indent="0"/>
-            <a:r>
-              <a:rPr lang="en-US" dirty="0" smtClean="0"/>
-              <a:t>Senior Partner</a:t>
-            </a:r>
-            <a:r>
-              <a:rPr lang="en-US" dirty="0"/>
-              <a:t>: </a:t>
-            </a:r>
-            <a:r>
-              <a:rPr lang="en-US" dirty="0" smtClean="0"/>
-              <a:t>T:-62.04</a:t>
-            </a:r>
-            <a:r>
-              <a:rPr lang="en-US" dirty="0"/>
-              <a:t>, &lt;</a:t>
-            </a:r>
-            <a:r>
-              <a:rPr lang="en-US" dirty="0" smtClean="0"/>
-              <a:t>2e-16***</a:t>
-            </a:r>
-            <a:endParaRPr dirty="0"/>
-          </a:p>
-        </p:txBody>
-      </p:sp>
-    </p:spTree>
-    <p:extLst>
-      <p:ext uri="{BB962C8B-B14F-4D97-AF65-F5344CB8AC3E}">
-        <p14:creationId xmlns:p14="http://schemas.microsoft.com/office/powerpoint/2010/main" val="1027114339"/>
-      </p:ext>
-    </p:extLst>
-  </p:cSld>
-  <p:clrMapOvr>
-    <a:masterClrMapping/>
-  </p:clrMapOvr>
-</p:sld>
-</file>
-
-<file path=ppt/slides/slide11.xml><?xml version="1.0" encoding="utf-8"?>
-<p:sld xmlns:a="http://schemas.openxmlformats.org/drawingml/2006/main" xmlns:r="http://schemas.openxmlformats.org/officeDocument/2006/relationships" xmlns:p="http://schemas.openxmlformats.org/presentationml/2006/main">
-  <p:cSld>
-    <p:spTree>
-      <p:nvGrpSpPr>
         <p:cNvPr id="1" name="Shape 417"/>
         <p:cNvGrpSpPr/>
         <p:nvPr/>
@@ -18132,15 +17881,7 @@
             </a:pPr>
             <a:r>
               <a:rPr lang="en-US" dirty="0" smtClean="0"/>
-              <a:t>Societal </a:t>
-            </a:r>
-            <a:r>
-              <a:rPr lang="en-US" dirty="0" smtClean="0"/>
-              <a:t>polarization (differences of opinions) </a:t>
-            </a:r>
-            <a:r>
-              <a:rPr lang="en-US" dirty="0" smtClean="0"/>
-              <a:t>could not be used due to the lack of data.</a:t>
+              <a:t>Societal polarization (differences of opinions) could not be used due to the lack of data.</a:t>
             </a:r>
             <a:endParaRPr dirty="0"/>
           </a:p>
@@ -18496,7 +18237,7 @@
 </p:sld>
 </file>
 
-<file path=ppt/slides/slide12.xml><?xml version="1.0" encoding="utf-8"?>
+<file path=ppt/slides/slide11.xml><?xml version="1.0" encoding="utf-8"?>
 <p:sld xmlns:a="http://schemas.openxmlformats.org/drawingml/2006/main" xmlns:r="http://schemas.openxmlformats.org/officeDocument/2006/relationships" xmlns:p="http://schemas.openxmlformats.org/presentationml/2006/main">
   <p:cSld>
     <p:spTree>
@@ -18676,7 +18417,7 @@
 </p:sld>
 </file>
 
-<file path=ppt/slides/slide13.xml><?xml version="1.0" encoding="utf-8"?>
+<file path=ppt/slides/slide12.xml><?xml version="1.0" encoding="utf-8"?>
 <p:sld xmlns:a="http://schemas.openxmlformats.org/drawingml/2006/main" xmlns:r="http://schemas.openxmlformats.org/officeDocument/2006/relationships" xmlns:p="http://schemas.openxmlformats.org/presentationml/2006/main">
   <p:cSld>
     <p:spTree>
@@ -19390,7 +19131,7 @@
 </p:sld>
 </file>
 
-<file path=ppt/slides/slide14.xml><?xml version="1.0" encoding="utf-8"?>
+<file path=ppt/slides/slide13.xml><?xml version="1.0" encoding="utf-8"?>
 <p:sld xmlns:a="http://schemas.openxmlformats.org/drawingml/2006/main" xmlns:r="http://schemas.openxmlformats.org/officeDocument/2006/relationships" xmlns:p="http://schemas.openxmlformats.org/presentationml/2006/main">
   <p:cSld>
     <p:spTree>
@@ -19846,7 +19587,7 @@
 </p:sld>
 </file>
 
-<file path=ppt/slides/slide15.xml><?xml version="1.0" encoding="utf-8"?>
+<file path=ppt/slides/slide14.xml><?xml version="1.0" encoding="utf-8"?>
 <p:sld xmlns:a="http://schemas.openxmlformats.org/drawingml/2006/main" xmlns:r="http://schemas.openxmlformats.org/officeDocument/2006/relationships" xmlns:p="http://schemas.openxmlformats.org/presentationml/2006/main">
   <p:cSld>
     <p:spTree>
@@ -20575,6 +20316,251 @@
         <p14:creationId xmlns:p14="http://schemas.microsoft.com/office/powerpoint/2010/main" val="4240757632"/>
       </p:ext>
     </p:extLst>
+  </p:cSld>
+  <p:clrMapOvr>
+    <a:masterClrMapping/>
+  </p:clrMapOvr>
+</p:sld>
+</file>
+
+<file path=ppt/slides/slide15.xml><?xml version="1.0" encoding="utf-8"?>
+<p:sld xmlns:a="http://schemas.openxmlformats.org/drawingml/2006/main" xmlns:r="http://schemas.openxmlformats.org/officeDocument/2006/relationships" xmlns:p="http://schemas.openxmlformats.org/presentationml/2006/main">
+  <p:cSld>
+    <p:spTree>
+      <p:nvGrpSpPr>
+        <p:cNvPr id="1" name="Shape 410"/>
+        <p:cNvGrpSpPr/>
+        <p:nvPr/>
+      </p:nvGrpSpPr>
+      <p:grpSpPr>
+        <a:xfrm>
+          <a:off x="0" y="0"/>
+          <a:ext cx="0" cy="0"/>
+          <a:chOff x="0" y="0"/>
+          <a:chExt cx="0" cy="0"/>
+        </a:xfrm>
+      </p:grpSpPr>
+      <p:sp>
+        <p:nvSpPr>
+          <p:cNvPr id="411" name="Google Shape;411;p40"/>
+          <p:cNvSpPr txBox="1">
+            <a:spLocks noGrp="1"/>
+          </p:cNvSpPr>
+          <p:nvPr>
+            <p:ph type="title"/>
+          </p:nvPr>
+        </p:nvSpPr>
+        <p:spPr>
+          <a:xfrm>
+            <a:off x="713225" y="445025"/>
+            <a:ext cx="7717500" cy="577800"/>
+          </a:xfrm>
+          <a:prstGeom prst="rect">
+            <a:avLst/>
+          </a:prstGeom>
+        </p:spPr>
+        <p:txBody>
+          <a:bodyPr spcFirstLastPara="1" wrap="square" lIns="91425" tIns="91425" rIns="91425" bIns="91425" anchor="t" anchorCtr="0">
+            <a:noAutofit/>
+          </a:bodyPr>
+          <a:lstStyle/>
+          <a:p>
+            <a:pPr marL="0" lvl="0" indent="0" algn="l" rtl="0">
+              <a:spcBef>
+                <a:spcPts val="0"/>
+              </a:spcBef>
+              <a:spcAft>
+                <a:spcPts val="0"/>
+              </a:spcAft>
+              <a:buClr>
+                <a:schemeClr val="dk1"/>
+              </a:buClr>
+              <a:buSzPts val="1100"/>
+              <a:buFont typeface="Arial"/>
+              <a:buNone/>
+            </a:pPr>
+            <a:r>
+              <a:rPr lang="en" dirty="0" smtClean="0"/>
+              <a:t>Designing an App</a:t>
+            </a:r>
+            <a:endParaRPr sz="3500" dirty="0">
+              <a:latin typeface="Gantari"/>
+              <a:ea typeface="Gantari"/>
+              <a:cs typeface="Gantari"/>
+              <a:sym typeface="Gantari"/>
+            </a:endParaRPr>
+          </a:p>
+        </p:txBody>
+      </p:sp>
+      <p:sp>
+        <p:nvSpPr>
+          <p:cNvPr id="412" name="Google Shape;412;p40"/>
+          <p:cNvSpPr txBox="1">
+            <a:spLocks noGrp="1"/>
+          </p:cNvSpPr>
+          <p:nvPr>
+            <p:ph type="subTitle" idx="1"/>
+          </p:nvPr>
+        </p:nvSpPr>
+        <p:spPr>
+          <a:xfrm>
+            <a:off x="750045" y="1685668"/>
+            <a:ext cx="3678300" cy="2346600"/>
+          </a:xfrm>
+          <a:prstGeom prst="rect">
+            <a:avLst/>
+          </a:prstGeom>
+        </p:spPr>
+        <p:txBody>
+          <a:bodyPr spcFirstLastPara="1" wrap="square" lIns="91425" tIns="91425" rIns="91425" bIns="91425" anchor="t" anchorCtr="0">
+            <a:noAutofit/>
+          </a:bodyPr>
+          <a:lstStyle/>
+          <a:p>
+            <a:pPr marL="285750" lvl="0" indent="-285750" algn="l" rtl="0">
+              <a:spcBef>
+                <a:spcPts val="0"/>
+              </a:spcBef>
+              <a:spcAft>
+                <a:spcPts val="0"/>
+              </a:spcAft>
+              <a:buClr>
+                <a:schemeClr val="dk1"/>
+              </a:buClr>
+              <a:buSzPts val="1100"/>
+              <a:buFont typeface="Arial" panose="020B0604020202020204" pitchFamily="34" charset="0"/>
+              <a:buChar char="•"/>
+            </a:pPr>
+            <a:r>
+              <a:rPr lang="en" dirty="0" smtClean="0"/>
+              <a:t>The point was not to find the results of what the V-Dem already did, rather to visualize it in a way that was interactive an accessable. </a:t>
+            </a:r>
+          </a:p>
+          <a:p>
+            <a:pPr marL="285750" lvl="0" indent="-285750" algn="l" rtl="0">
+              <a:spcBef>
+                <a:spcPts val="0"/>
+              </a:spcBef>
+              <a:spcAft>
+                <a:spcPts val="0"/>
+              </a:spcAft>
+              <a:buClr>
+                <a:schemeClr val="dk1"/>
+              </a:buClr>
+              <a:buSzPts val="1100"/>
+              <a:buFont typeface="Arial" panose="020B0604020202020204" pitchFamily="34" charset="0"/>
+              <a:buChar char="•"/>
+            </a:pPr>
+            <a:endParaRPr lang="en" dirty="0"/>
+          </a:p>
+          <a:p>
+            <a:pPr marL="285750" lvl="0" indent="-285750" algn="l" rtl="0">
+              <a:spcBef>
+                <a:spcPts val="0"/>
+              </a:spcBef>
+              <a:spcAft>
+                <a:spcPts val="0"/>
+              </a:spcAft>
+              <a:buClr>
+                <a:schemeClr val="dk1"/>
+              </a:buClr>
+              <a:buSzPts val="1100"/>
+              <a:buFont typeface="Arial" panose="020B0604020202020204" pitchFamily="34" charset="0"/>
+              <a:buChar char="•"/>
+            </a:pPr>
+            <a:r>
+              <a:rPr lang="en" dirty="0" smtClean="0"/>
+              <a:t>This is a visualization of three different datasets hoping to tell a story that convey the same end-goal. </a:t>
+            </a:r>
+            <a:endParaRPr dirty="0"/>
+          </a:p>
+        </p:txBody>
+      </p:sp>
+      <p:sp>
+        <p:nvSpPr>
+          <p:cNvPr id="413" name="Google Shape;413;p40"/>
+          <p:cNvSpPr txBox="1">
+            <a:spLocks noGrp="1"/>
+          </p:cNvSpPr>
+          <p:nvPr>
+            <p:ph type="subTitle" idx="2"/>
+          </p:nvPr>
+        </p:nvSpPr>
+        <p:spPr>
+          <a:xfrm>
+            <a:off x="4715655" y="1685668"/>
+            <a:ext cx="3678300" cy="2346600"/>
+          </a:xfrm>
+          <a:prstGeom prst="rect">
+            <a:avLst/>
+          </a:prstGeom>
+        </p:spPr>
+        <p:txBody>
+          <a:bodyPr spcFirstLastPara="1" wrap="square" lIns="91425" tIns="91425" rIns="91425" bIns="91425" anchor="t" anchorCtr="0">
+            <a:noAutofit/>
+          </a:bodyPr>
+          <a:lstStyle/>
+          <a:p>
+            <a:pPr marL="285750" lvl="0" indent="-285750" algn="l" rtl="0">
+              <a:spcBef>
+                <a:spcPts val="0"/>
+              </a:spcBef>
+              <a:spcAft>
+                <a:spcPts val="0"/>
+              </a:spcAft>
+              <a:buClr>
+                <a:schemeClr val="dk1"/>
+              </a:buClr>
+              <a:buSzPts val="1100"/>
+              <a:buFont typeface="Arial" panose="020B0604020202020204" pitchFamily="34" charset="0"/>
+              <a:buChar char="•"/>
+            </a:pPr>
+            <a:r>
+              <a:rPr lang="en" dirty="0" smtClean="0"/>
+              <a:t>R-Shiny used multiple methods that introduced trends and both linear and non-linear models to answer the question if democracy is dissappearing lately. </a:t>
+            </a:r>
+          </a:p>
+          <a:p>
+            <a:pPr marL="285750" lvl="0" indent="-285750" algn="l" rtl="0">
+              <a:spcBef>
+                <a:spcPts val="0"/>
+              </a:spcBef>
+              <a:spcAft>
+                <a:spcPts val="0"/>
+              </a:spcAft>
+              <a:buClr>
+                <a:schemeClr val="dk1"/>
+              </a:buClr>
+              <a:buSzPts val="1100"/>
+              <a:buFont typeface="Arial" panose="020B0604020202020204" pitchFamily="34" charset="0"/>
+              <a:buChar char="•"/>
+            </a:pPr>
+            <a:endParaRPr lang="en" dirty="0"/>
+          </a:p>
+          <a:p>
+            <a:pPr marL="285750" lvl="0" indent="-285750" algn="l" rtl="0">
+              <a:spcBef>
+                <a:spcPts val="0"/>
+              </a:spcBef>
+              <a:spcAft>
+                <a:spcPts val="0"/>
+              </a:spcAft>
+              <a:buClr>
+                <a:schemeClr val="dk1"/>
+              </a:buClr>
+              <a:buSzPts val="1100"/>
+              <a:buFont typeface="Arial" panose="020B0604020202020204" pitchFamily="34" charset="0"/>
+              <a:buChar char="•"/>
+            </a:pPr>
+            <a:r>
+              <a:rPr lang="en-US" dirty="0" smtClean="0"/>
+              <a:t>The hope, then, is to match the base assumption of the key factors that V-Dem assumed.</a:t>
+            </a:r>
+            <a:endParaRPr dirty="0"/>
+          </a:p>
+        </p:txBody>
+      </p:sp>
+    </p:spTree>
   </p:cSld>
   <p:clrMapOvr>
     <a:masterClrMapping/>
@@ -23070,15 +23056,7 @@
             </a:pPr>
             <a:r>
               <a:rPr lang="en" dirty="0" smtClean="0"/>
-              <a:t>Each of the three waves hit a “peak”, </a:t>
-            </a:r>
-            <a:r>
-              <a:rPr lang="en" dirty="0" smtClean="0"/>
-              <a:t>where even now </a:t>
-            </a:r>
-            <a:r>
-              <a:rPr lang="en" dirty="0" smtClean="0"/>
-              <a:t>the number of countries autocratizing now outpaces the number of countries democratizing.</a:t>
+              <a:t>Each of the three waves hit a “peak”, where even now the number of countries autocratizing now outpaces the number of countries democratizing.</a:t>
             </a:r>
             <a:endParaRPr dirty="0"/>
           </a:p>
@@ -25556,251 +25534,6 @@
   <p:cSld>
     <p:spTree>
       <p:nvGrpSpPr>
-        <p:cNvPr id="1" name="Shape 410"/>
-        <p:cNvGrpSpPr/>
-        <p:nvPr/>
-      </p:nvGrpSpPr>
-      <p:grpSpPr>
-        <a:xfrm>
-          <a:off x="0" y="0"/>
-          <a:ext cx="0" cy="0"/>
-          <a:chOff x="0" y="0"/>
-          <a:chExt cx="0" cy="0"/>
-        </a:xfrm>
-      </p:grpSpPr>
-      <p:sp>
-        <p:nvSpPr>
-          <p:cNvPr id="411" name="Google Shape;411;p40"/>
-          <p:cNvSpPr txBox="1">
-            <a:spLocks noGrp="1"/>
-          </p:cNvSpPr>
-          <p:nvPr>
-            <p:ph type="title"/>
-          </p:nvPr>
-        </p:nvSpPr>
-        <p:spPr>
-          <a:xfrm>
-            <a:off x="713225" y="445025"/>
-            <a:ext cx="7717500" cy="577800"/>
-          </a:xfrm>
-          <a:prstGeom prst="rect">
-            <a:avLst/>
-          </a:prstGeom>
-        </p:spPr>
-        <p:txBody>
-          <a:bodyPr spcFirstLastPara="1" wrap="square" lIns="91425" tIns="91425" rIns="91425" bIns="91425" anchor="t" anchorCtr="0">
-            <a:noAutofit/>
-          </a:bodyPr>
-          <a:lstStyle/>
-          <a:p>
-            <a:pPr marL="0" lvl="0" indent="0" algn="l" rtl="0">
-              <a:spcBef>
-                <a:spcPts val="0"/>
-              </a:spcBef>
-              <a:spcAft>
-                <a:spcPts val="0"/>
-              </a:spcAft>
-              <a:buClr>
-                <a:schemeClr val="dk1"/>
-              </a:buClr>
-              <a:buSzPts val="1100"/>
-              <a:buFont typeface="Arial"/>
-              <a:buNone/>
-            </a:pPr>
-            <a:r>
-              <a:rPr lang="en" dirty="0" smtClean="0"/>
-              <a:t>Designing an App</a:t>
-            </a:r>
-            <a:endParaRPr sz="3500" dirty="0">
-              <a:latin typeface="Gantari"/>
-              <a:ea typeface="Gantari"/>
-              <a:cs typeface="Gantari"/>
-              <a:sym typeface="Gantari"/>
-            </a:endParaRPr>
-          </a:p>
-        </p:txBody>
-      </p:sp>
-      <p:sp>
-        <p:nvSpPr>
-          <p:cNvPr id="412" name="Google Shape;412;p40"/>
-          <p:cNvSpPr txBox="1">
-            <a:spLocks noGrp="1"/>
-          </p:cNvSpPr>
-          <p:nvPr>
-            <p:ph type="subTitle" idx="1"/>
-          </p:nvPr>
-        </p:nvSpPr>
-        <p:spPr>
-          <a:xfrm>
-            <a:off x="750045" y="1685668"/>
-            <a:ext cx="3678300" cy="2346600"/>
-          </a:xfrm>
-          <a:prstGeom prst="rect">
-            <a:avLst/>
-          </a:prstGeom>
-        </p:spPr>
-        <p:txBody>
-          <a:bodyPr spcFirstLastPara="1" wrap="square" lIns="91425" tIns="91425" rIns="91425" bIns="91425" anchor="t" anchorCtr="0">
-            <a:noAutofit/>
-          </a:bodyPr>
-          <a:lstStyle/>
-          <a:p>
-            <a:pPr marL="285750" lvl="0" indent="-285750" algn="l" rtl="0">
-              <a:spcBef>
-                <a:spcPts val="0"/>
-              </a:spcBef>
-              <a:spcAft>
-                <a:spcPts val="0"/>
-              </a:spcAft>
-              <a:buClr>
-                <a:schemeClr val="dk1"/>
-              </a:buClr>
-              <a:buSzPts val="1100"/>
-              <a:buFont typeface="Arial" panose="020B0604020202020204" pitchFamily="34" charset="0"/>
-              <a:buChar char="•"/>
-            </a:pPr>
-            <a:r>
-              <a:rPr lang="en" dirty="0" smtClean="0"/>
-              <a:t>The point was not to find the results of what the V-Dem already did, rather to visualize it in a way that was interactive an accessable. </a:t>
-            </a:r>
-          </a:p>
-          <a:p>
-            <a:pPr marL="285750" lvl="0" indent="-285750" algn="l" rtl="0">
-              <a:spcBef>
-                <a:spcPts val="0"/>
-              </a:spcBef>
-              <a:spcAft>
-                <a:spcPts val="0"/>
-              </a:spcAft>
-              <a:buClr>
-                <a:schemeClr val="dk1"/>
-              </a:buClr>
-              <a:buSzPts val="1100"/>
-              <a:buFont typeface="Arial" panose="020B0604020202020204" pitchFamily="34" charset="0"/>
-              <a:buChar char="•"/>
-            </a:pPr>
-            <a:endParaRPr lang="en" dirty="0"/>
-          </a:p>
-          <a:p>
-            <a:pPr marL="285750" lvl="0" indent="-285750" algn="l" rtl="0">
-              <a:spcBef>
-                <a:spcPts val="0"/>
-              </a:spcBef>
-              <a:spcAft>
-                <a:spcPts val="0"/>
-              </a:spcAft>
-              <a:buClr>
-                <a:schemeClr val="dk1"/>
-              </a:buClr>
-              <a:buSzPts val="1100"/>
-              <a:buFont typeface="Arial" panose="020B0604020202020204" pitchFamily="34" charset="0"/>
-              <a:buChar char="•"/>
-            </a:pPr>
-            <a:r>
-              <a:rPr lang="en" dirty="0" smtClean="0"/>
-              <a:t>This is a visualization of three different datasets hoping to tell a story that convey the same end-goal. </a:t>
-            </a:r>
-            <a:endParaRPr dirty="0"/>
-          </a:p>
-        </p:txBody>
-      </p:sp>
-      <p:sp>
-        <p:nvSpPr>
-          <p:cNvPr id="413" name="Google Shape;413;p40"/>
-          <p:cNvSpPr txBox="1">
-            <a:spLocks noGrp="1"/>
-          </p:cNvSpPr>
-          <p:nvPr>
-            <p:ph type="subTitle" idx="2"/>
-          </p:nvPr>
-        </p:nvSpPr>
-        <p:spPr>
-          <a:xfrm>
-            <a:off x="4715655" y="1685668"/>
-            <a:ext cx="3678300" cy="2346600"/>
-          </a:xfrm>
-          <a:prstGeom prst="rect">
-            <a:avLst/>
-          </a:prstGeom>
-        </p:spPr>
-        <p:txBody>
-          <a:bodyPr spcFirstLastPara="1" wrap="square" lIns="91425" tIns="91425" rIns="91425" bIns="91425" anchor="t" anchorCtr="0">
-            <a:noAutofit/>
-          </a:bodyPr>
-          <a:lstStyle/>
-          <a:p>
-            <a:pPr marL="285750" lvl="0" indent="-285750" algn="l" rtl="0">
-              <a:spcBef>
-                <a:spcPts val="0"/>
-              </a:spcBef>
-              <a:spcAft>
-                <a:spcPts val="0"/>
-              </a:spcAft>
-              <a:buClr>
-                <a:schemeClr val="dk1"/>
-              </a:buClr>
-              <a:buSzPts val="1100"/>
-              <a:buFont typeface="Arial" panose="020B0604020202020204" pitchFamily="34" charset="0"/>
-              <a:buChar char="•"/>
-            </a:pPr>
-            <a:r>
-              <a:rPr lang="en" dirty="0" smtClean="0"/>
-              <a:t>R-Shiny used multiple methods that introduced trends and both linear and non-linear models to answer the question if democracy is dissappearing lately. </a:t>
-            </a:r>
-          </a:p>
-          <a:p>
-            <a:pPr marL="285750" lvl="0" indent="-285750" algn="l" rtl="0">
-              <a:spcBef>
-                <a:spcPts val="0"/>
-              </a:spcBef>
-              <a:spcAft>
-                <a:spcPts val="0"/>
-              </a:spcAft>
-              <a:buClr>
-                <a:schemeClr val="dk1"/>
-              </a:buClr>
-              <a:buSzPts val="1100"/>
-              <a:buFont typeface="Arial" panose="020B0604020202020204" pitchFamily="34" charset="0"/>
-              <a:buChar char="•"/>
-            </a:pPr>
-            <a:endParaRPr lang="en" dirty="0"/>
-          </a:p>
-          <a:p>
-            <a:pPr marL="285750" lvl="0" indent="-285750" algn="l" rtl="0">
-              <a:spcBef>
-                <a:spcPts val="0"/>
-              </a:spcBef>
-              <a:spcAft>
-                <a:spcPts val="0"/>
-              </a:spcAft>
-              <a:buClr>
-                <a:schemeClr val="dk1"/>
-              </a:buClr>
-              <a:buSzPts val="1100"/>
-              <a:buFont typeface="Arial" panose="020B0604020202020204" pitchFamily="34" charset="0"/>
-              <a:buChar char="•"/>
-            </a:pPr>
-            <a:r>
-              <a:rPr lang="en-US" dirty="0" smtClean="0"/>
-              <a:t>The hope, then, is to match the base assumption of the key factors that V-Dem assumed.</a:t>
-            </a:r>
-            <a:endParaRPr dirty="0"/>
-          </a:p>
-        </p:txBody>
-      </p:sp>
-    </p:spTree>
-  </p:cSld>
-  <p:clrMapOvr>
-    <a:masterClrMapping/>
-  </p:clrMapOvr>
-</p:sld>
-</file>
-
-<file path=ppt/slides/slide7.xml><?xml version="1.0" encoding="utf-8"?>
-<p:sld xmlns:a="http://schemas.openxmlformats.org/drawingml/2006/main" xmlns:r="http://schemas.openxmlformats.org/officeDocument/2006/relationships" xmlns:p="http://schemas.openxmlformats.org/presentationml/2006/main">
-  <p:cSld>
-    <p:spTree>
-      <p:nvGrpSpPr>
         <p:cNvPr id="1" name="Shape 721"/>
         <p:cNvGrpSpPr/>
         <p:nvPr/>
@@ -26387,7 +26120,7 @@
 </p:sld>
 </file>
 
-<file path=ppt/slides/slide8.xml><?xml version="1.0" encoding="utf-8"?>
+<file path=ppt/slides/slide7.xml><?xml version="1.0" encoding="utf-8"?>
 <p:sld xmlns:a="http://schemas.openxmlformats.org/drawingml/2006/main" xmlns:r="http://schemas.openxmlformats.org/officeDocument/2006/relationships" xmlns:p="http://schemas.openxmlformats.org/presentationml/2006/main">
   <p:cSld>
     <p:spTree>
@@ -26573,7 +26306,7 @@
 </p:sld>
 </file>
 
-<file path=ppt/slides/slide9.xml><?xml version="1.0" encoding="utf-8"?>
+<file path=ppt/slides/slide8.xml><?xml version="1.0" encoding="utf-8"?>
 <p:sld xmlns:a="http://schemas.openxmlformats.org/drawingml/2006/main" xmlns:r="http://schemas.openxmlformats.org/officeDocument/2006/relationships" xmlns:p="http://schemas.openxmlformats.org/presentationml/2006/main">
   <p:cSld>
     <p:spTree>
@@ -26758,6 +26491,257 @@
     <p:extLst>
       <p:ext uri="{BB962C8B-B14F-4D97-AF65-F5344CB8AC3E}">
         <p14:creationId xmlns:p14="http://schemas.microsoft.com/office/powerpoint/2010/main" val="518190675"/>
+      </p:ext>
+    </p:extLst>
+  </p:cSld>
+  <p:clrMapOvr>
+    <a:masterClrMapping/>
+  </p:clrMapOvr>
+</p:sld>
+</file>
+
+<file path=ppt/slides/slide9.xml><?xml version="1.0" encoding="utf-8"?>
+<p:sld xmlns:a="http://schemas.openxmlformats.org/drawingml/2006/main" xmlns:r="http://schemas.openxmlformats.org/officeDocument/2006/relationships" xmlns:p="http://schemas.openxmlformats.org/presentationml/2006/main">
+  <p:cSld>
+    <p:spTree>
+      <p:nvGrpSpPr>
+        <p:cNvPr id="1" name=""/>
+        <p:cNvGrpSpPr/>
+        <p:nvPr/>
+      </p:nvGrpSpPr>
+      <p:grpSpPr>
+        <a:xfrm>
+          <a:off x="0" y="0"/>
+          <a:ext cx="0" cy="0"/>
+          <a:chOff x="0" y="0"/>
+          <a:chExt cx="0" cy="0"/>
+        </a:xfrm>
+      </p:grpSpPr>
+      <p:sp>
+        <p:nvSpPr>
+          <p:cNvPr id="2" name="Title 1"/>
+          <p:cNvSpPr>
+            <a:spLocks noGrp="1"/>
+          </p:cNvSpPr>
+          <p:nvPr>
+            <p:ph type="title"/>
+          </p:nvPr>
+        </p:nvSpPr>
+        <p:spPr>
+          <a:xfrm>
+            <a:off x="163099" y="65884"/>
+            <a:ext cx="7717500" cy="577800"/>
+          </a:xfrm>
+        </p:spPr>
+        <p:txBody>
+          <a:bodyPr/>
+          <a:lstStyle/>
+          <a:p>
+            <a:r>
+              <a:rPr lang="en-US" dirty="0" smtClean="0"/>
+              <a:t>A New Order: The Populist Rhetoric</a:t>
+            </a:r>
+            <a:endParaRPr lang="en-US" dirty="0"/>
+          </a:p>
+        </p:txBody>
+      </p:sp>
+      <p:pic>
+        <p:nvPicPr>
+          <p:cNvPr id="5" name="Picture 4"/>
+          <p:cNvPicPr>
+            <a:picLocks noChangeAspect="1"/>
+          </p:cNvPicPr>
+          <p:nvPr/>
+        </p:nvPicPr>
+        <p:blipFill>
+          <a:blip r:embed="rId3">
+            <a:extLst>
+              <a:ext uri="{28A0092B-C50C-407E-A947-70E740481C1C}">
+                <a14:useLocalDpi xmlns:a14="http://schemas.microsoft.com/office/drawing/2010/main" val="0"/>
+              </a:ext>
+            </a:extLst>
+          </a:blip>
+          <a:stretch>
+            <a:fillRect/>
+          </a:stretch>
+        </p:blipFill>
+        <p:spPr>
+          <a:xfrm>
+            <a:off x="4674761" y="1620644"/>
+            <a:ext cx="3904477" cy="3196954"/>
+          </a:xfrm>
+          <a:prstGeom prst="rect">
+            <a:avLst/>
+          </a:prstGeom>
+        </p:spPr>
+      </p:pic>
+      <p:pic>
+        <p:nvPicPr>
+          <p:cNvPr id="6" name="Picture 5"/>
+          <p:cNvPicPr>
+            <a:picLocks noChangeAspect="1"/>
+          </p:cNvPicPr>
+          <p:nvPr/>
+        </p:nvPicPr>
+        <p:blipFill>
+          <a:blip r:embed="rId4">
+            <a:extLst>
+              <a:ext uri="{28A0092B-C50C-407E-A947-70E740481C1C}">
+                <a14:useLocalDpi xmlns:a14="http://schemas.microsoft.com/office/drawing/2010/main" val="0"/>
+              </a:ext>
+            </a:extLst>
+          </a:blip>
+          <a:stretch>
+            <a:fillRect/>
+          </a:stretch>
+        </p:blipFill>
+        <p:spPr>
+          <a:xfrm>
+            <a:off x="378689" y="1620644"/>
+            <a:ext cx="3885987" cy="3181815"/>
+          </a:xfrm>
+          <a:prstGeom prst="rect">
+            <a:avLst/>
+          </a:prstGeom>
+        </p:spPr>
+      </p:pic>
+      <p:sp>
+        <p:nvSpPr>
+          <p:cNvPr id="7" name="Google Shape;706;p54"/>
+          <p:cNvSpPr txBox="1">
+            <a:spLocks noGrp="1"/>
+          </p:cNvSpPr>
+          <p:nvPr>
+            <p:ph type="subTitle" idx="1"/>
+          </p:nvPr>
+        </p:nvSpPr>
+        <p:spPr>
+          <a:xfrm>
+            <a:off x="163098" y="703157"/>
+            <a:ext cx="8416139" cy="917487"/>
+          </a:xfrm>
+          <a:prstGeom prst="rect">
+            <a:avLst/>
+          </a:prstGeom>
+        </p:spPr>
+        <p:txBody>
+          <a:bodyPr spcFirstLastPara="1" wrap="square" lIns="91425" tIns="91425" rIns="91425" bIns="91425" anchor="t" anchorCtr="0">
+            <a:noAutofit/>
+          </a:bodyPr>
+          <a:lstStyle/>
+          <a:p>
+            <a:pPr marL="285750" lvl="0" indent="-285750" algn="l">
+              <a:buFont typeface="Arial" panose="020B0604020202020204" pitchFamily="34" charset="0"/>
+              <a:buChar char="•"/>
+            </a:pPr>
+            <a:r>
+              <a:rPr lang="en-US" dirty="0" smtClean="0"/>
+              <a:t>Analysis shows that populism is a significant factor when it comes to the liberal democracy index, almost across the board. Both in and out of government, the results are statistically significant, when the Senior Partner having the strongest relationship. Only for populism’s “in government but not represented” is it not statistically significant, but that can easily be blamed on the lack of data.</a:t>
+            </a:r>
+            <a:endParaRPr dirty="0"/>
+          </a:p>
+        </p:txBody>
+      </p:sp>
+      <p:sp>
+        <p:nvSpPr>
+          <p:cNvPr id="9" name="Google Shape;706;p54"/>
+          <p:cNvSpPr txBox="1">
+            <a:spLocks noGrp="1"/>
+          </p:cNvSpPr>
+          <p:nvPr>
+            <p:ph type="subTitle" idx="1"/>
+          </p:nvPr>
+        </p:nvSpPr>
+        <p:spPr>
+          <a:xfrm>
+            <a:off x="5352585" y="4802459"/>
+            <a:ext cx="3442010" cy="341041"/>
+          </a:xfrm>
+          <a:prstGeom prst="rect">
+            <a:avLst/>
+          </a:prstGeom>
+        </p:spPr>
+        <p:txBody>
+          <a:bodyPr spcFirstLastPara="1" wrap="square" lIns="91425" tIns="91425" rIns="91425" bIns="91425" anchor="t" anchorCtr="0">
+            <a:noAutofit/>
+          </a:bodyPr>
+          <a:lstStyle/>
+          <a:p>
+            <a:pPr lvl="0" indent="0"/>
+            <a:r>
+              <a:rPr lang="en-US" dirty="0"/>
+              <a:t>In Opposition: </a:t>
+            </a:r>
+            <a:r>
+              <a:rPr lang="en-US" dirty="0" smtClean="0"/>
+              <a:t>T:-44.62, </a:t>
+            </a:r>
+            <a:r>
+              <a:rPr lang="en-US" dirty="0"/>
+              <a:t>&lt;</a:t>
+            </a:r>
+            <a:r>
+              <a:rPr lang="en-US" dirty="0" smtClean="0"/>
+              <a:t>2e-16***</a:t>
+            </a:r>
+            <a:endParaRPr dirty="0"/>
+          </a:p>
+        </p:txBody>
+      </p:sp>
+      <p:sp>
+        <p:nvSpPr>
+          <p:cNvPr id="10" name="Google Shape;706;p54"/>
+          <p:cNvSpPr txBox="1">
+            <a:spLocks noGrp="1"/>
+          </p:cNvSpPr>
+          <p:nvPr>
+            <p:ph type="subTitle" idx="1"/>
+          </p:nvPr>
+        </p:nvSpPr>
+        <p:spPr>
+          <a:xfrm>
+            <a:off x="378689" y="4817598"/>
+            <a:ext cx="3724960" cy="341041"/>
+          </a:xfrm>
+          <a:prstGeom prst="rect">
+            <a:avLst/>
+          </a:prstGeom>
+        </p:spPr>
+        <p:txBody>
+          <a:bodyPr spcFirstLastPara="1" wrap="square" lIns="91425" tIns="91425" rIns="91425" bIns="91425" anchor="t" anchorCtr="0">
+            <a:noAutofit/>
+          </a:bodyPr>
+          <a:lstStyle/>
+          <a:p>
+            <a:pPr lvl="0" indent="0"/>
+            <a:r>
+              <a:rPr lang="en-US" dirty="0" smtClean="0"/>
+              <a:t>Senior Partner</a:t>
+            </a:r>
+            <a:r>
+              <a:rPr lang="en-US" dirty="0"/>
+              <a:t>: </a:t>
+            </a:r>
+            <a:r>
+              <a:rPr lang="en-US" dirty="0" smtClean="0"/>
+              <a:t>T:-62.04</a:t>
+            </a:r>
+            <a:r>
+              <a:rPr lang="en-US" dirty="0"/>
+              <a:t>, &lt;</a:t>
+            </a:r>
+            <a:r>
+              <a:rPr lang="en-US" dirty="0" smtClean="0"/>
+              <a:t>2e-16***</a:t>
+            </a:r>
+            <a:endParaRPr dirty="0"/>
+          </a:p>
+        </p:txBody>
+      </p:sp>
+    </p:spTree>
+    <p:extLst>
+      <p:ext uri="{BB962C8B-B14F-4D97-AF65-F5344CB8AC3E}">
+        <p14:creationId xmlns:p14="http://schemas.microsoft.com/office/powerpoint/2010/main" val="1027114339"/>
       </p:ext>
     </p:extLst>
   </p:cSld>

</xml_diff>

<commit_message>
Adjusted the slides a bit
Presentation more aligns with app being shown later
</commit_message>
<xml_diff>
--- a/PowerPoint/R_Project_Presentation.pptx
+++ b/PowerPoint/R_Project_Presentation.pptx
@@ -30,21 +30,21 @@
   <p:notesSz cx="6858000" cy="9144000"/>
   <p:embeddedFontLst>
     <p:embeddedFont>
-      <p:font typeface="Gantari" panose="020B0604020202020204" charset="0"/>
+      <p:font typeface="Nunito" panose="020B0604020202020204" charset="0"/>
       <p:regular r:id="rId20"/>
       <p:bold r:id="rId21"/>
       <p:italic r:id="rId22"/>
       <p:boldItalic r:id="rId23"/>
     </p:embeddedFont>
     <p:embeddedFont>
-      <p:font typeface="Rokkitt" panose="020B0604020202020204" charset="0"/>
+      <p:font typeface="Gantari" panose="020B0604020202020204" charset="0"/>
       <p:regular r:id="rId24"/>
       <p:bold r:id="rId25"/>
       <p:italic r:id="rId26"/>
       <p:boldItalic r:id="rId27"/>
     </p:embeddedFont>
     <p:embeddedFont>
-      <p:font typeface="Nunito" panose="020B0604020202020204" charset="0"/>
+      <p:font typeface="Rokkitt" panose="020B0604020202020204" charset="0"/>
       <p:regular r:id="rId28"/>
       <p:bold r:id="rId29"/>
       <p:italic r:id="rId30"/>
@@ -941,6 +941,10 @@
               <a:rPr lang="en-US" baseline="0" dirty="0" smtClean="0"/>
               <a:t> into separate, antagonistic political camps. It is essentially an extension of anti-pluralism, where opponents can interact in a friendly manner or interact in a violent manner. </a:t>
             </a:r>
+            <a:r>
+              <a:rPr lang="en-US" baseline="0" dirty="0" smtClean="0"/>
+              <a:t>It has been shown to increase alongside the increasing trend of populism, in a statistically significant way. </a:t>
+            </a:r>
             <a:endParaRPr dirty="0"/>
           </a:p>
         </p:txBody>
@@ -1159,6 +1163,10 @@
             <a:r>
               <a:rPr lang="en-US" baseline="0" dirty="0" smtClean="0"/>
               <a:t>., so it can’t be compared against the democracy index. However, when it doesn’t like with Colombia, they do reflect off each other. </a:t>
+            </a:r>
+            <a:r>
+              <a:rPr lang="en-US" baseline="0" dirty="0" smtClean="0"/>
+              <a:t>When every country in the world is taken into account, a reflection trend is also shown as well.</a:t>
             </a:r>
             <a:endParaRPr lang="en-US" dirty="0"/>
           </a:p>
@@ -1343,11 +1351,23 @@
             </a:pPr>
             <a:r>
               <a:rPr lang="en-US" dirty="0" smtClean="0"/>
-              <a:t>To put these measurements into</a:t>
+              <a:t>As mentioned, to </a:t>
+            </a:r>
+            <a:r>
+              <a:rPr lang="en-US" dirty="0" smtClean="0"/>
+              <a:t>put these measurements into</a:t>
             </a:r>
             <a:r>
               <a:rPr lang="en-US" baseline="0" dirty="0" smtClean="0"/>
-              <a:t> perspective, an R-Shiny app was creating, which was the point of the project. It is a combination of technically four datasets, one of which was created by hand, with the goal of matching the results of the V-Dem Project and creating an interactive and reactive app. </a:t>
+              <a:t> perspective, an R-Shiny app was </a:t>
+            </a:r>
+            <a:r>
+              <a:rPr lang="en-US" baseline="0" dirty="0" smtClean="0"/>
+              <a:t>created, </a:t>
+            </a:r>
+            <a:r>
+              <a:rPr lang="en-US" baseline="0" dirty="0" smtClean="0"/>
+              <a:t>which was the point of the project. It is a combination of technically four datasets, one of which was created by hand, with the goal of matching the results of the V-Dem Project and creating an interactive and reactive app. </a:t>
             </a:r>
             <a:endParaRPr dirty="0"/>
           </a:p>
@@ -1742,7 +1762,23 @@
             </a:r>
             <a:r>
               <a:rPr lang="en-US" baseline="0" dirty="0" smtClean="0"/>
-              <a:t> there were three waves of democracy, one that came from suffrage, another from the end of WWII, and the final with the transition from socialist regimes to democratic ones. A democracy itself has a negative view of political power, with the rule of law in place. On the other end are autocracies, where liberties are no longer protected and the government is not responsible to its citizens. </a:t>
+              <a:t> what is a democracy? A democracy in itself has a negative view of political power, with an elected government and strong rule of law. On the other end are autocracies, where liberties are no longer protected and the government is not responsible to its citizens. </a:t>
+            </a:r>
+            <a:r>
+              <a:rPr lang="en-US" dirty="0" smtClean="0"/>
+              <a:t>There </a:t>
+            </a:r>
+            <a:r>
+              <a:rPr lang="en-US" baseline="0" dirty="0" smtClean="0"/>
+              <a:t>were </a:t>
+            </a:r>
+            <a:r>
+              <a:rPr lang="en-US" baseline="0" dirty="0" smtClean="0"/>
+              <a:t>three waves of democracy, one that came from suffrage, another from the end of WWII, and the final with the transition from socialist regimes to democratic ones</a:t>
+            </a:r>
+            <a:r>
+              <a:rPr lang="en-US" baseline="0" dirty="0" smtClean="0"/>
+              <a:t>. </a:t>
             </a:r>
             <a:endParaRPr dirty="0"/>
           </a:p>
@@ -1974,7 +2010,15 @@
             </a:r>
             <a:r>
               <a:rPr lang="en-US" baseline="0" dirty="0" smtClean="0"/>
-              <a:t> democracies once believed “strong” began to show signs of backsliding since the mid-2000s. In fact, some third wave democracies have even become stronger democracies than their longer-standing counterparts. </a:t>
+              <a:t> democracies once believed “strong</a:t>
+            </a:r>
+            <a:r>
+              <a:rPr lang="en-US" baseline="0" dirty="0" smtClean="0"/>
+              <a:t>”, that is the democracies that were well-established, wealthy, and stable, </a:t>
+            </a:r>
+            <a:r>
+              <a:rPr lang="en-US" baseline="0" dirty="0" smtClean="0"/>
+              <a:t>began to show signs of backsliding since the mid-2000s. In fact, some third wave democracies have even become stronger democracies than their longer-standing counterparts. </a:t>
             </a:r>
             <a:endParaRPr dirty="0"/>
           </a:p>
@@ -2086,7 +2130,15 @@
             </a:r>
             <a:r>
               <a:rPr lang="en-US" baseline="0" dirty="0" smtClean="0"/>
-              <a:t> trend was picked up by the Varieties of Democracy Project, an international effort to measure the state of democracy in the world. It uses indices to measure democracy itself, splitting it into five similar measurements, and also analyzes political parties in much the same way. The V—Dem Project already decided that the most significant factors influencing democratic backsliding were: political polarization, populistic rhetoric and anti-pluralism, and wealth inequality. </a:t>
+              <a:t> trend was picked up by the Varieties of Democracy Project, an international effort to measure the state of democracy in the world. It uses indices to measure democracy itself, splitting it into five similar measurements, and also analyzes political parties in much the same way. The V—Dem Project </a:t>
+            </a:r>
+            <a:r>
+              <a:rPr lang="en-US" baseline="0" dirty="0" smtClean="0"/>
+              <a:t>concluded </a:t>
+            </a:r>
+            <a:r>
+              <a:rPr lang="en-US" baseline="0" dirty="0" smtClean="0"/>
+              <a:t>that the most significant factors influencing democratic backsliding were: political polarization, populistic rhetoric and anti-pluralism, and wealth inequality. </a:t>
             </a:r>
             <a:endParaRPr dirty="0"/>
           </a:p>
@@ -2194,11 +2246,31 @@
             </a:pPr>
             <a:r>
               <a:rPr lang="en-US" dirty="0" smtClean="0"/>
-              <a:t>The first “tab” was</a:t>
+              <a:t>Here, we have the actual trends displayed</a:t>
             </a:r>
             <a:r>
               <a:rPr lang="en-US" baseline="0" dirty="0" smtClean="0"/>
-              <a:t> to create a world map based on the liberal democracy index, judging the democracy based on the “limits placed on the government” and its ability to protect individual and minority rights. Since the V-Dem dataset wasn’t a </a:t>
+              <a:t> on a world map in a Shiny App made to represent the V-Dem Projects findings. </a:t>
+            </a:r>
+            <a:r>
+              <a:rPr lang="en-US" dirty="0" smtClean="0"/>
+              <a:t>This </a:t>
+            </a:r>
+            <a:r>
+              <a:rPr lang="en-US" dirty="0" smtClean="0"/>
+              <a:t>first “tab” was</a:t>
+            </a:r>
+            <a:r>
+              <a:rPr lang="en-US" baseline="0" dirty="0" smtClean="0"/>
+              <a:t> </a:t>
+            </a:r>
+            <a:r>
+              <a:rPr lang="en-US" baseline="0" dirty="0" smtClean="0"/>
+              <a:t>designed to </a:t>
+            </a:r>
+            <a:r>
+              <a:rPr lang="en-US" baseline="0" dirty="0" smtClean="0"/>
+              <a:t>create a world map based on the liberal democracy index, judging the democracy based on the “limits placed on the government” and its ability to protect individual and minority rights. Since the V-Dem dataset wasn’t a </a:t>
             </a:r>
             <a:r>
               <a:rPr lang="en-US" baseline="0" dirty="0" err="1" smtClean="0"/>
@@ -2214,7 +2286,15 @@
             </a:r>
             <a:r>
               <a:rPr lang="en-US" baseline="0" dirty="0" smtClean="0"/>
-              <a:t> based on columns, along with a mouse-hover that provides a textbox.</a:t>
+              <a:t> based on </a:t>
+            </a:r>
+            <a:r>
+              <a:rPr lang="en-US" baseline="0" dirty="0" smtClean="0"/>
+              <a:t>columns with the years as variables, </a:t>
+            </a:r>
+            <a:r>
+              <a:rPr lang="en-US" baseline="0" dirty="0" smtClean="0"/>
+              <a:t>along with a mouse-hover that provides a textbox.</a:t>
             </a:r>
             <a:endParaRPr dirty="0"/>
           </a:p>
@@ -20554,7 +20634,19 @@
             </a:pPr>
             <a:r>
               <a:rPr lang="en-US" dirty="0" smtClean="0"/>
-              <a:t>The hope, then, is to match the base assumption of the key factors that V-Dem assumed.</a:t>
+              <a:t>The hope, then</a:t>
+            </a:r>
+            <a:r>
+              <a:rPr lang="en-US" smtClean="0"/>
+              <a:t>, </a:t>
+            </a:r>
+            <a:r>
+              <a:rPr lang="en-US" smtClean="0"/>
+              <a:t>was </a:t>
+            </a:r>
+            <a:r>
+              <a:rPr lang="en-US" dirty="0" smtClean="0"/>
+              <a:t>to match the base assumption of the key factors that V-Dem assumed.</a:t>
             </a:r>
             <a:endParaRPr dirty="0"/>
           </a:p>

</xml_diff>

<commit_message>
Added in comments about Arab countries having a positive regression instead of a negative one
</commit_message>
<xml_diff>
--- a/PowerPoint/R_Project_Presentation.pptx
+++ b/PowerPoint/R_Project_Presentation.pptx
@@ -1053,7 +1053,12 @@
             <p:ph type="sldImg"/>
           </p:nvPr>
         </p:nvSpPr>
-        <p:spPr/>
+        <p:spPr>
+          <a:xfrm>
+            <a:off x="381000" y="685800"/>
+            <a:ext cx="6096000" cy="3429000"/>
+          </a:xfrm>
+        </p:spPr>
       </p:sp>
       <p:sp>
         <p:nvSpPr>
@@ -1231,7 +1236,23 @@
             </a:r>
             <a:r>
               <a:rPr lang="en-US" baseline="0" dirty="0" smtClean="0"/>
-              <a:t> the models in terms of variance, yet only had Asia being statistically insignificant. When a weighted regression was used for the regions, the direction of the strength of the relationship also seemed to have no consistency, likely due to that lack of variance. Western Europe was the only region that remotely resembled what the others displayed, which suggests that Gini only matters if inequality and democracy is already high. </a:t>
+              <a:t> the models in terms of variance, yet only had Asia being statistically insignificant. When a weighted regression was used for the regions, the direction of the strength of the relationship also seemed to have no consistency, likely due to that lack of variance. Western Europe </a:t>
+            </a:r>
+            <a:r>
+              <a:rPr lang="en-US" baseline="0" dirty="0" smtClean="0"/>
+              <a:t>had the strongest t value, but was offset by outliers that caused it to diverge into the positive as Gini raised into further inequality, </a:t>
+            </a:r>
+            <a:r>
+              <a:rPr lang="en-US" baseline="0" dirty="0" smtClean="0"/>
+              <a:t>which suggests that Gini only matters if </a:t>
+            </a:r>
+            <a:r>
+              <a:rPr lang="en-US" baseline="0" dirty="0" smtClean="0"/>
+              <a:t>it is </a:t>
+            </a:r>
+            <a:r>
+              <a:rPr lang="en-US" baseline="0" smtClean="0"/>
+              <a:t>already fluctuating. </a:t>
             </a:r>
             <a:endParaRPr lang="en-US" dirty="0"/>
           </a:p>
@@ -17182,11 +17203,7 @@
             </a:pPr>
             <a:r>
               <a:rPr lang="en" dirty="0" smtClean="0"/>
-              <a:t>By Daniel </a:t>
-            </a:r>
-            <a:r>
-              <a:rPr lang="en" dirty="0" smtClean="0"/>
-              <a:t>Immediato</a:t>
+              <a:t>By Daniel Immediato</a:t>
             </a:r>
           </a:p>
           <a:p>
@@ -17208,7 +17225,6 @@
               <a:rPr lang="en" dirty="0" smtClean="0"/>
               <a:t>3/37/2024</a:t>
             </a:r>
-            <a:endParaRPr lang="en" dirty="0" smtClean="0"/>
           </a:p>
           <a:p>
             <a:pPr marL="0" lvl="0" indent="0" algn="l" rtl="0">
@@ -18215,7 +18231,7 @@
         </p:nvSpPr>
         <p:spPr>
           <a:xfrm>
-            <a:off x="713225" y="80142"/>
+            <a:off x="668620" y="-79356"/>
             <a:ext cx="7717500" cy="577800"/>
           </a:xfrm>
         </p:spPr>
@@ -18243,8 +18259,8 @@
         </p:nvSpPr>
         <p:spPr>
           <a:xfrm>
-            <a:off x="579410" y="657942"/>
-            <a:ext cx="8624063" cy="492000"/>
+            <a:off x="326650" y="506234"/>
+            <a:ext cx="8817350" cy="1134302"/>
           </a:xfrm>
         </p:spPr>
         <p:txBody>
@@ -18252,10 +18268,22 @@
           <a:lstStyle/>
           <a:p>
             <a:r>
-              <a:rPr lang="en-US" dirty="0" smtClean="0"/>
-              <a:t>From polarization we see a regression where, as the country increases in polarization, the liberal democracy level decreases. However, this seems to mainly only apply to countries that are already established as democracies, having a much less of an effect on an already autocrat regime. Note Eastern Europe has a .06 R-Squared, so it barely explains any of the variance in the data.</a:t>
+              <a:rPr lang="en-US" sz="1300" dirty="0" smtClean="0"/>
+              <a:t>From polarization we see a regression where, as the country increases in polarization, the liberal democracy level decreases. However, this seems to mainly only apply to countries that are already established as democracies, having a much less of an effect on an already </a:t>
             </a:r>
-            <a:endParaRPr lang="en-US" dirty="0"/>
+            <a:r>
+              <a:rPr lang="en-US" sz="1300" dirty="0" smtClean="0"/>
+              <a:t>autocratic </a:t>
+            </a:r>
+            <a:r>
+              <a:rPr lang="en-US" sz="1300" dirty="0" smtClean="0"/>
+              <a:t>regime. Note </a:t>
+            </a:r>
+            <a:r>
+              <a:rPr lang="en-US" sz="1300" dirty="0" smtClean="0"/>
+              <a:t>how the Middle East actually REVERSES the trend, if only slightly. This can be blamed on the monarchies in the region and other authoritarian governments that don’t allow for political expression, as well as the abysmal variance of .008. </a:t>
+            </a:r>
+            <a:endParaRPr lang="en-US" sz="1300" dirty="0"/>
           </a:p>
         </p:txBody>
       </p:sp>
@@ -18573,36 +18601,6 @@
           </a:p>
         </p:txBody>
       </p:sp>
-      <p:pic>
-        <p:nvPicPr>
-          <p:cNvPr id="7" name="Picture 6"/>
-          <p:cNvPicPr>
-            <a:picLocks noChangeAspect="1"/>
-          </p:cNvPicPr>
-          <p:nvPr/>
-        </p:nvPicPr>
-        <p:blipFill>
-          <a:blip r:embed="rId4">
-            <a:extLst>
-              <a:ext uri="{28A0092B-C50C-407E-A947-70E740481C1C}">
-                <a14:useLocalDpi xmlns:a14="http://schemas.microsoft.com/office/drawing/2010/main" val="0"/>
-              </a:ext>
-            </a:extLst>
-          </a:blip>
-          <a:stretch>
-            <a:fillRect/>
-          </a:stretch>
-        </p:blipFill>
-        <p:spPr>
-          <a:xfrm>
-            <a:off x="4571975" y="1672682"/>
-            <a:ext cx="4082338" cy="2795576"/>
-          </a:xfrm>
-          <a:prstGeom prst="rect">
-            <a:avLst/>
-          </a:prstGeom>
-        </p:spPr>
-      </p:pic>
       <p:sp>
         <p:nvSpPr>
           <p:cNvPr id="8" name="Google Shape;706;p54"/>
@@ -18881,12 +18879,54 @@
             </a:pPr>
             <a:r>
               <a:rPr lang="en-US" dirty="0" smtClean="0"/>
-              <a:t>Eastern Europe: T:-9.006, &lt;2e-16***</a:t>
+              <a:t>Arab Nations</a:t>
+            </a:r>
+            <a:r>
+              <a:rPr lang="en-US" dirty="0"/>
+              <a:t>: </a:t>
+            </a:r>
+            <a:r>
+              <a:rPr lang="en-US" dirty="0" smtClean="0"/>
+              <a:t>T:3.268</a:t>
+            </a:r>
+            <a:r>
+              <a:rPr lang="en-US" dirty="0"/>
+              <a:t>, 0.00112 **</a:t>
             </a:r>
             <a:endParaRPr lang="en-US" dirty="0"/>
           </a:p>
         </p:txBody>
       </p:sp>
+      <p:pic>
+        <p:nvPicPr>
+          <p:cNvPr id="5" name="Picture 4"/>
+          <p:cNvPicPr>
+            <a:picLocks noChangeAspect="1"/>
+          </p:cNvPicPr>
+          <p:nvPr/>
+        </p:nvPicPr>
+        <p:blipFill>
+          <a:blip r:embed="rId4">
+            <a:extLst>
+              <a:ext uri="{28A0092B-C50C-407E-A947-70E740481C1C}">
+                <a14:useLocalDpi xmlns:a14="http://schemas.microsoft.com/office/drawing/2010/main" val="0"/>
+              </a:ext>
+            </a:extLst>
+          </a:blip>
+          <a:stretch>
+            <a:fillRect/>
+          </a:stretch>
+        </p:blipFill>
+        <p:spPr>
+          <a:xfrm>
+            <a:off x="4631448" y="1670143"/>
+            <a:ext cx="4082338" cy="2798115"/>
+          </a:xfrm>
+          <a:prstGeom prst="rect">
+            <a:avLst/>
+          </a:prstGeom>
+        </p:spPr>
+      </p:pic>
     </p:spTree>
     <p:extLst>
       <p:ext uri="{BB962C8B-B14F-4D97-AF65-F5344CB8AC3E}">
@@ -22019,7 +22059,7 @@
         </p:nvSpPr>
         <p:spPr>
           <a:xfrm>
-            <a:off x="713225" y="1600625"/>
+            <a:off x="326649" y="1600625"/>
             <a:ext cx="7717500" cy="577800"/>
           </a:xfrm>
           <a:prstGeom prst="rect">
@@ -22284,7 +22324,7 @@
           <a:p>
             <a:r>
               <a:rPr lang="en-US" dirty="0" smtClean="0"/>
-              <a:t>Concerns?</a:t>
+              <a:t>Suggestions?</a:t>
             </a:r>
             <a:endParaRPr lang="en-US" dirty="0"/>
           </a:p>

</xml_diff>